<commit_message>
Add app insights example. Update presentation with customer pricing assistance
</commit_message>
<xml_diff>
--- a/pricing/presentation.pptx
+++ b/pricing/presentation.pptx
@@ -6,19 +6,20 @@
     <p:sldMasterId id="2147484608" r:id="rId5"/>
   </p:sldMasterIdLst>
   <p:notesMasterIdLst>
-    <p:notesMasterId r:id="rId13"/>
+    <p:notesMasterId r:id="rId14"/>
   </p:notesMasterIdLst>
   <p:handoutMasterIdLst>
-    <p:handoutMasterId r:id="rId14"/>
+    <p:handoutMasterId r:id="rId15"/>
   </p:handoutMasterIdLst>
   <p:sldIdLst>
     <p:sldId id="1678" r:id="rId6"/>
     <p:sldId id="1667" r:id="rId7"/>
-    <p:sldId id="1676" r:id="rId8"/>
-    <p:sldId id="1680" r:id="rId9"/>
-    <p:sldId id="10830" r:id="rId10"/>
-    <p:sldId id="10833" r:id="rId11"/>
-    <p:sldId id="10832" r:id="rId12"/>
+    <p:sldId id="1680" r:id="rId8"/>
+    <p:sldId id="1676" r:id="rId9"/>
+    <p:sldId id="10834" r:id="rId10"/>
+    <p:sldId id="10830" r:id="rId11"/>
+    <p:sldId id="10833" r:id="rId12"/>
+    <p:sldId id="10832" r:id="rId13"/>
   </p:sldIdLst>
   <p:sldSz cx="12436475" cy="6994525"/>
   <p:notesSz cx="6858000" cy="9144000"/>
@@ -124,8 +125,9 @@
           <p14:sldIdLst>
             <p14:sldId id="1678"/>
             <p14:sldId id="1667"/>
+            <p14:sldId id="1680"/>
             <p14:sldId id="1676"/>
-            <p14:sldId id="1680"/>
+            <p14:sldId id="10834"/>
             <p14:sldId id="10830"/>
             <p14:sldId id="10833"/>
             <p14:sldId id="10832"/>
@@ -271,7 +273,7 @@
               <a:rPr lang="en-US" smtClean="0">
                 <a:latin typeface="Segoe UI" pitchFamily="34" charset="0"/>
               </a:rPr>
-              <a:t>5/16/2024 3:34 PM</a:t>
+              <a:t>5/17/2024 4:56 PM</a:t>
             </a:fld>
             <a:endParaRPr lang="en-US" dirty="0">
               <a:latin typeface="Segoe UI" pitchFamily="34" charset="0"/>
@@ -581,7 +583,7 @@
           <a:p>
             <a:fld id="{DCE60099-03E7-4FA1-8A7F-E6E6CFB0F855}" type="datetime8">
               <a:rPr lang="en-US" smtClean="0"/>
-              <a:t>5/16/2024 3:34 PM</a:t>
+              <a:t>5/17/2024 9:20 AM</a:t>
             </a:fld>
             <a:endParaRPr lang="en-US" dirty="0"/>
           </a:p>
@@ -1290,7 +1292,7 @@
     </p:spTree>
     <p:extLst>
       <p:ext uri="{BB962C8B-B14F-4D97-AF65-F5344CB8AC3E}">
-        <p14:creationId xmlns:p14="http://schemas.microsoft.com/office/powerpoint/2010/main" val="2493548078"/>
+        <p14:creationId xmlns:p14="http://schemas.microsoft.com/office/powerpoint/2010/main" val="1968664653"/>
       </p:ext>
     </p:extLst>
   </p:cSld>
@@ -1448,7 +1450,7 @@
     </p:spTree>
     <p:extLst>
       <p:ext uri="{BB962C8B-B14F-4D97-AF65-F5344CB8AC3E}">
-        <p14:creationId xmlns:p14="http://schemas.microsoft.com/office/powerpoint/2010/main" val="1968664653"/>
+        <p14:creationId xmlns:p14="http://schemas.microsoft.com/office/powerpoint/2010/main" val="2493548078"/>
       </p:ext>
     </p:extLst>
   </p:cSld>
@@ -1597,7 +1599,165 @@
             <a:fld id="{B4008EB6-D09E-4580-8CD6-DDB14511944F}" type="slidenum">
               <a:rPr lang="en-US" smtClean="0"/>
               <a:pPr/>
-              <a:t>6</a:t>
+              <a:t>5</a:t>
+            </a:fld>
+            <a:endParaRPr lang="en-US" dirty="0"/>
+          </a:p>
+        </p:txBody>
+      </p:sp>
+    </p:spTree>
+    <p:extLst>
+      <p:ext uri="{BB962C8B-B14F-4D97-AF65-F5344CB8AC3E}">
+        <p14:creationId xmlns:p14="http://schemas.microsoft.com/office/powerpoint/2010/main" val="1157460820"/>
+      </p:ext>
+    </p:extLst>
+  </p:cSld>
+  <p:clrMapOvr>
+    <a:masterClrMapping/>
+  </p:clrMapOvr>
+</p:notes>
+</file>
+
+<file path=ppt/notesSlides/notesSlide6.xml><?xml version="1.0" encoding="utf-8"?>
+<p:notes xmlns:a="http://schemas.openxmlformats.org/drawingml/2006/main" xmlns:r="http://schemas.openxmlformats.org/officeDocument/2006/relationships" xmlns:p="http://schemas.openxmlformats.org/presentationml/2006/main">
+  <p:cSld>
+    <p:spTree>
+      <p:nvGrpSpPr>
+        <p:cNvPr id="1" name=""/>
+        <p:cNvGrpSpPr/>
+        <p:nvPr/>
+      </p:nvGrpSpPr>
+      <p:grpSpPr>
+        <a:xfrm>
+          <a:off x="0" y="0"/>
+          <a:ext cx="0" cy="0"/>
+          <a:chOff x="0" y="0"/>
+          <a:chExt cx="0" cy="0"/>
+        </a:xfrm>
+      </p:grpSpPr>
+      <p:sp>
+        <p:nvSpPr>
+          <p:cNvPr id="2" name="Slide Image Placeholder 1"/>
+          <p:cNvSpPr>
+            <a:spLocks noGrp="1" noRot="1" noChangeAspect="1"/>
+          </p:cNvSpPr>
+          <p:nvPr>
+            <p:ph type="sldImg"/>
+          </p:nvPr>
+        </p:nvSpPr>
+        <p:spPr/>
+      </p:sp>
+      <p:sp>
+        <p:nvSpPr>
+          <p:cNvPr id="3" name="Notes Placeholder 2"/>
+          <p:cNvSpPr>
+            <a:spLocks noGrp="1"/>
+          </p:cNvSpPr>
+          <p:nvPr>
+            <p:ph type="body" idx="1"/>
+          </p:nvPr>
+        </p:nvSpPr>
+        <p:spPr/>
+        <p:txBody>
+          <a:bodyPr/>
+          <a:lstStyle/>
+          <a:p>
+            <a:endParaRPr lang="en-US" dirty="0"/>
+          </a:p>
+        </p:txBody>
+      </p:sp>
+      <p:sp>
+        <p:nvSpPr>
+          <p:cNvPr id="4" name="Header Placeholder 3"/>
+          <p:cNvSpPr>
+            <a:spLocks noGrp="1"/>
+          </p:cNvSpPr>
+          <p:nvPr>
+            <p:ph type="hdr" sz="quarter"/>
+          </p:nvPr>
+        </p:nvSpPr>
+        <p:spPr/>
+        <p:txBody>
+          <a:bodyPr/>
+          <a:lstStyle/>
+          <a:p>
+            <a:endParaRPr lang="en-US" dirty="0"/>
+          </a:p>
+        </p:txBody>
+      </p:sp>
+      <p:sp>
+        <p:nvSpPr>
+          <p:cNvPr id="5" name="Footer Placeholder 4"/>
+          <p:cNvSpPr>
+            <a:spLocks noGrp="1"/>
+          </p:cNvSpPr>
+          <p:nvPr>
+            <p:ph type="ftr" sz="quarter" idx="4"/>
+          </p:nvPr>
+        </p:nvSpPr>
+        <p:spPr/>
+        <p:txBody>
+          <a:bodyPr/>
+          <a:lstStyle/>
+          <a:p>
+            <a:pPr defTabSz="914099" eaLnBrk="0" hangingPunct="0"/>
+            <a:r>
+              <a:rPr lang="en-US" sz="400">
+                <a:gradFill>
+                  <a:gsLst>
+                    <a:gs pos="0">
+                      <a:prstClr val="black"/>
+                    </a:gs>
+                    <a:gs pos="100000">
+                      <a:prstClr val="black"/>
+                    </a:gs>
+                  </a:gsLst>
+                  <a:lin ang="5400000" scaled="0"/>
+                </a:gradFill>
+                <a:latin typeface="Segoe UI" pitchFamily="34" charset="0"/>
+                <a:ea typeface="Segoe UI" pitchFamily="34" charset="0"/>
+                <a:cs typeface="Segoe UI" pitchFamily="34" charset="0"/>
+              </a:rPr>
+              <a:t>© Microsoft Corporation</a:t>
+            </a:r>
+            <a:endParaRPr lang="en-US" sz="400" dirty="0">
+              <a:gradFill>
+                <a:gsLst>
+                  <a:gs pos="0">
+                    <a:prstClr val="black"/>
+                  </a:gs>
+                  <a:gs pos="100000">
+                    <a:prstClr val="black"/>
+                  </a:gs>
+                </a:gsLst>
+                <a:lin ang="5400000" scaled="0"/>
+              </a:gradFill>
+              <a:latin typeface="Segoe UI" pitchFamily="34" charset="0"/>
+              <a:ea typeface="Segoe UI" pitchFamily="34" charset="0"/>
+              <a:cs typeface="Segoe UI" pitchFamily="34" charset="0"/>
+            </a:endParaRPr>
+          </a:p>
+        </p:txBody>
+      </p:sp>
+      <p:sp>
+        <p:nvSpPr>
+          <p:cNvPr id="6" name="Slide Number Placeholder 5"/>
+          <p:cNvSpPr>
+            <a:spLocks noGrp="1"/>
+          </p:cNvSpPr>
+          <p:nvPr>
+            <p:ph type="sldNum" sz="quarter" idx="5"/>
+          </p:nvPr>
+        </p:nvSpPr>
+        <p:spPr/>
+        <p:txBody>
+          <a:bodyPr/>
+          <a:lstStyle/>
+          <a:p>
+            <a:fld id="{B4008EB6-D09E-4580-8CD6-DDB14511944F}" type="slidenum">
+              <a:rPr lang="en-US" smtClean="0"/>
+              <a:pPr/>
+              <a:t>7</a:t>
             </a:fld>
             <a:endParaRPr lang="en-US" dirty="0"/>
           </a:p>
@@ -20035,6 +20195,163 @@
       </p:grpSpPr>
       <p:sp>
         <p:nvSpPr>
+          <p:cNvPr id="14" name="Title 13">
+            <a:extLst>
+              <a:ext uri="{FF2B5EF4-FFF2-40B4-BE49-F238E27FC236}">
+                <a16:creationId xmlns:a16="http://schemas.microsoft.com/office/drawing/2014/main" id="{E307D465-5D56-0B41-96C4-901FFC2422DF}"/>
+              </a:ext>
+            </a:extLst>
+          </p:cNvPr>
+          <p:cNvSpPr>
+            <a:spLocks noGrp="1"/>
+          </p:cNvSpPr>
+          <p:nvPr>
+            <p:ph type="title"/>
+          </p:nvPr>
+        </p:nvSpPr>
+        <p:spPr>
+          <a:xfrm>
+            <a:off x="465138" y="632779"/>
+            <a:ext cx="11533187" cy="410369"/>
+          </a:xfrm>
+        </p:spPr>
+        <p:txBody>
+          <a:bodyPr/>
+          <a:lstStyle/>
+          <a:p>
+            <a:r>
+              <a:rPr lang="en-US" dirty="0"/>
+              <a:t>Cost Assistance for Customers</a:t>
+            </a:r>
+          </a:p>
+        </p:txBody>
+      </p:sp>
+      <p:sp>
+        <p:nvSpPr>
+          <p:cNvPr id="15" name="Text Placeholder 14">
+            <a:extLst>
+              <a:ext uri="{FF2B5EF4-FFF2-40B4-BE49-F238E27FC236}">
+                <a16:creationId xmlns:a16="http://schemas.microsoft.com/office/drawing/2014/main" id="{7AFD9358-0F0F-DD41-8430-DD40142A3348}"/>
+              </a:ext>
+            </a:extLst>
+          </p:cNvPr>
+          <p:cNvSpPr>
+            <a:spLocks noGrp="1"/>
+          </p:cNvSpPr>
+          <p:nvPr>
+            <p:ph type="body" sz="quarter" idx="10"/>
+          </p:nvPr>
+        </p:nvSpPr>
+        <p:spPr>
+          <a:xfrm>
+            <a:off x="465138" y="1960860"/>
+            <a:ext cx="9572625" cy="3139321"/>
+          </a:xfrm>
+        </p:spPr>
+        <p:txBody>
+          <a:bodyPr/>
+          <a:lstStyle/>
+          <a:p>
+            <a:r>
+              <a:rPr lang="en-US" dirty="0"/>
+              <a:t>End-Customer Investment Funding (ECIF)</a:t>
+            </a:r>
+          </a:p>
+          <a:p>
+            <a:pPr marL="514350" lvl="1" indent="-285750">
+              <a:buFont typeface="Arial" panose="020B0604020202020204" pitchFamily="34" charset="0"/>
+              <a:buChar char="•"/>
+            </a:pPr>
+            <a:r>
+              <a:rPr lang="en-US" sz="1600" dirty="0"/>
+              <a:t>A set of funds for services delivered to Microsoft customers in support of Microsoft products, to drive deployment or migration of Microsoft products and solutions, or to provide support or product quality remediation.</a:t>
+            </a:r>
+          </a:p>
+          <a:p>
+            <a:pPr marL="514350" lvl="1" indent="-285750">
+              <a:buFont typeface="Arial" panose="020B0604020202020204" pitchFamily="34" charset="0"/>
+              <a:buChar char="•"/>
+            </a:pPr>
+            <a:endParaRPr lang="en-US" dirty="0"/>
+          </a:p>
+          <a:p>
+            <a:r>
+              <a:rPr lang="en-US" dirty="0"/>
+              <a:t>Azure Commitment Discount (ACD)</a:t>
+            </a:r>
+          </a:p>
+          <a:p>
+            <a:pPr marL="571500" lvl="1" indent="-342900">
+              <a:buFont typeface="Arial" panose="020B0604020202020204" pitchFamily="34" charset="0"/>
+              <a:buChar char="•"/>
+            </a:pPr>
+            <a:r>
+              <a:rPr lang="en-US" sz="1600" dirty="0"/>
+              <a:t>A Microsoft discount program available to customers based on their commitment to spend across Azure services</a:t>
+            </a:r>
+            <a:r>
+              <a:rPr lang="en-US" dirty="0"/>
+              <a:t>.</a:t>
+            </a:r>
+          </a:p>
+          <a:p>
+            <a:endParaRPr lang="en-US" dirty="0"/>
+          </a:p>
+          <a:p>
+            <a:r>
+              <a:rPr lang="en-US" dirty="0"/>
+              <a:t>Plus others (</a:t>
+            </a:r>
+            <a:r>
+              <a:rPr lang="en-US"/>
+              <a:t>ask STU </a:t>
+            </a:r>
+            <a:r>
+              <a:rPr lang="en-US" dirty="0"/>
+              <a:t>leads)</a:t>
+            </a:r>
+          </a:p>
+          <a:p>
+            <a:pPr lvl="1"/>
+            <a:endParaRPr lang="en-US" dirty="0"/>
+          </a:p>
+        </p:txBody>
+      </p:sp>
+    </p:spTree>
+    <p:extLst>
+      <p:ext uri="{BB962C8B-B14F-4D97-AF65-F5344CB8AC3E}">
+        <p14:creationId xmlns:p14="http://schemas.microsoft.com/office/powerpoint/2010/main" val="1285768130"/>
+      </p:ext>
+    </p:extLst>
+  </p:cSld>
+  <p:clrMapOvr>
+    <a:masterClrMapping/>
+  </p:clrMapOvr>
+  <p:transition>
+    <p:fade/>
+  </p:transition>
+</p:sld>
+</file>
+
+<file path=ppt/slides/slide4.xml><?xml version="1.0" encoding="utf-8"?>
+<p:sld xmlns:a="http://schemas.openxmlformats.org/drawingml/2006/main" xmlns:r="http://schemas.openxmlformats.org/officeDocument/2006/relationships" xmlns:p="http://schemas.openxmlformats.org/presentationml/2006/main">
+  <p:cSld>
+    <p:spTree>
+      <p:nvGrpSpPr>
+        <p:cNvPr id="1" name=""/>
+        <p:cNvGrpSpPr/>
+        <p:nvPr/>
+      </p:nvGrpSpPr>
+      <p:grpSpPr>
+        <a:xfrm>
+          <a:off x="0" y="0"/>
+          <a:ext cx="0" cy="0"/>
+          <a:chOff x="0" y="0"/>
+          <a:chExt cx="0" cy="0"/>
+        </a:xfrm>
+      </p:grpSpPr>
+      <p:sp>
+        <p:nvSpPr>
           <p:cNvPr id="2" name="Title 1">
             <a:extLst>
               <a:ext uri="{FF2B5EF4-FFF2-40B4-BE49-F238E27FC236}">
@@ -20813,7 +21130,7 @@
 </p:sld>
 </file>
 
-<file path=ppt/slides/slide4.xml><?xml version="1.0" encoding="utf-8"?>
+<file path=ppt/slides/slide5.xml><?xml version="1.0" encoding="utf-8"?>
 <p:sld xmlns:a="http://schemas.openxmlformats.org/drawingml/2006/main" xmlns:r="http://schemas.openxmlformats.org/officeDocument/2006/relationships" xmlns:p="http://schemas.openxmlformats.org/presentationml/2006/main">
   <p:cSld>
     <p:spTree>
@@ -20930,7 +21247,7 @@
     </p:spTree>
     <p:extLst>
       <p:ext uri="{BB962C8B-B14F-4D97-AF65-F5344CB8AC3E}">
-        <p14:creationId xmlns:p14="http://schemas.microsoft.com/office/powerpoint/2010/main" val="1285768130"/>
+        <p14:creationId xmlns:p14="http://schemas.microsoft.com/office/powerpoint/2010/main" val="2144049248"/>
       </p:ext>
     </p:extLst>
   </p:cSld>
@@ -20943,7 +21260,7 @@
 </p:sld>
 </file>
 
-<file path=ppt/slides/slide5.xml><?xml version="1.0" encoding="utf-8"?>
+<file path=ppt/slides/slide6.xml><?xml version="1.0" encoding="utf-8"?>
 <p:sld xmlns:a="http://schemas.openxmlformats.org/drawingml/2006/main" xmlns:r="http://schemas.openxmlformats.org/officeDocument/2006/relationships" xmlns:p="http://schemas.openxmlformats.org/presentationml/2006/main">
   <p:cSld>
     <p:spTree>
@@ -20990,31 +21307,6 @@
       </p:sp>
       <p:sp>
         <p:nvSpPr>
-          <p:cNvPr id="3" name="Text Placeholder 2">
-            <a:extLst>
-              <a:ext uri="{FF2B5EF4-FFF2-40B4-BE49-F238E27FC236}">
-                <a16:creationId xmlns:a16="http://schemas.microsoft.com/office/drawing/2014/main" id="{0517FF31-F24B-87D7-ED65-500BE153C8B0}"/>
-              </a:ext>
-            </a:extLst>
-          </p:cNvPr>
-          <p:cNvSpPr>
-            <a:spLocks noGrp="1"/>
-          </p:cNvSpPr>
-          <p:nvPr>
-            <p:ph type="body" sz="quarter" idx="13"/>
-          </p:nvPr>
-        </p:nvSpPr>
-        <p:spPr/>
-        <p:txBody>
-          <a:bodyPr/>
-          <a:lstStyle/>
-          <a:p>
-            <a:endParaRPr lang="en-US"/>
-          </a:p>
-        </p:txBody>
-      </p:sp>
-      <p:sp>
-        <p:nvSpPr>
           <p:cNvPr id="4" name="Text Placeholder 3">
             <a:extLst>
               <a:ext uri="{FF2B5EF4-FFF2-40B4-BE49-F238E27FC236}">
@@ -21027,31 +21319,6 @@
           </p:cNvSpPr>
           <p:nvPr>
             <p:ph type="body" sz="quarter" idx="14"/>
-          </p:nvPr>
-        </p:nvSpPr>
-        <p:spPr/>
-        <p:txBody>
-          <a:bodyPr/>
-          <a:lstStyle/>
-          <a:p>
-            <a:endParaRPr lang="en-US"/>
-          </a:p>
-        </p:txBody>
-      </p:sp>
-      <p:sp>
-        <p:nvSpPr>
-          <p:cNvPr id="5" name="Text Placeholder 4">
-            <a:extLst>
-              <a:ext uri="{FF2B5EF4-FFF2-40B4-BE49-F238E27FC236}">
-                <a16:creationId xmlns:a16="http://schemas.microsoft.com/office/drawing/2014/main" id="{86D0A246-15B1-4857-14B9-5737A667AC64}"/>
-              </a:ext>
-            </a:extLst>
-          </p:cNvPr>
-          <p:cNvSpPr>
-            <a:spLocks noGrp="1"/>
-          </p:cNvSpPr>
-          <p:nvPr>
-            <p:ph type="body" sz="quarter" idx="17"/>
           </p:nvPr>
         </p:nvSpPr>
         <p:spPr/>
@@ -21088,6 +21355,36 @@
           </a:p>
         </p:txBody>
       </p:sp>
+      <p:pic>
+        <p:nvPicPr>
+          <p:cNvPr id="8" name="Picture 7">
+            <a:extLst>
+              <a:ext uri="{FF2B5EF4-FFF2-40B4-BE49-F238E27FC236}">
+                <a16:creationId xmlns:a16="http://schemas.microsoft.com/office/drawing/2014/main" id="{7F1DEE35-FB6D-B2CD-D7AB-0CA33E330842}"/>
+              </a:ext>
+            </a:extLst>
+          </p:cNvPr>
+          <p:cNvPicPr>
+            <a:picLocks noChangeAspect="1"/>
+          </p:cNvPicPr>
+          <p:nvPr/>
+        </p:nvPicPr>
+        <p:blipFill>
+          <a:blip r:embed="rId2"/>
+          <a:stretch>
+            <a:fillRect/>
+          </a:stretch>
+        </p:blipFill>
+        <p:spPr>
+          <a:xfrm>
+            <a:off x="1608515" y="1727695"/>
+            <a:ext cx="9219444" cy="4498249"/>
+          </a:xfrm>
+          <a:prstGeom prst="rect">
+            <a:avLst/>
+          </a:prstGeom>
+        </p:spPr>
+      </p:pic>
     </p:spTree>
     <p:extLst>
       <p:ext uri="{BB962C8B-B14F-4D97-AF65-F5344CB8AC3E}">
@@ -21104,7 +21401,7 @@
 </p:sld>
 </file>
 
-<file path=ppt/slides/slide6.xml><?xml version="1.0" encoding="utf-8"?>
+<file path=ppt/slides/slide7.xml><?xml version="1.0" encoding="utf-8"?>
 <p:sld xmlns:a="http://schemas.openxmlformats.org/drawingml/2006/main" xmlns:r="http://schemas.openxmlformats.org/officeDocument/2006/relationships" xmlns:p="http://schemas.openxmlformats.org/presentationml/2006/main">
   <p:cSld>
     <p:spTree>
@@ -21263,7 +21560,7 @@
 </p:sld>
 </file>
 
-<file path=ppt/slides/slide7.xml><?xml version="1.0" encoding="utf-8"?>
+<file path=ppt/slides/slide8.xml><?xml version="1.0" encoding="utf-8"?>
 <p:sld xmlns:a="http://schemas.openxmlformats.org/drawingml/2006/main" xmlns:r="http://schemas.openxmlformats.org/officeDocument/2006/relationships" xmlns:p="http://schemas.openxmlformats.org/presentationml/2006/main">
   <p:cSld>
     <p:spTree>

</xml_diff>

<commit_message>
Fix malformed instructions for json keys and update presentation
</commit_message>
<xml_diff>
--- a/pricing/presentation.pptx
+++ b/pricing/presentation.pptx
@@ -273,7 +273,7 @@
               <a:rPr lang="en-US" smtClean="0">
                 <a:latin typeface="Segoe UI" pitchFamily="34" charset="0"/>
               </a:rPr>
-              <a:t>5/17/2024 4:56 PM</a:t>
+              <a:t>5/22/2024 1:48 PM</a:t>
             </a:fld>
             <a:endParaRPr lang="en-US" dirty="0">
               <a:latin typeface="Segoe UI" pitchFamily="34" charset="0"/>
@@ -583,7 +583,7 @@
           <a:p>
             <a:fld id="{DCE60099-03E7-4FA1-8A7F-E6E6CFB0F855}" type="datetime8">
               <a:rPr lang="en-US" smtClean="0"/>
-              <a:t>5/17/2024 9:20 AM</a:t>
+              <a:t>5/22/2024 1:32 PM</a:t>
             </a:fld>
             <a:endParaRPr lang="en-US" dirty="0"/>
           </a:p>
@@ -20116,7 +20116,15 @@
           <a:p>
             <a:r>
               <a:rPr lang="en-US" dirty="0"/>
-              <a:t>Unused Azure compute capacity at a significant discount. </a:t>
+              <a:t>Unused Azure </a:t>
+            </a:r>
+            <a:r>
+              <a:rPr lang="en-US" b="1" dirty="0"/>
+              <a:t>CPU</a:t>
+            </a:r>
+            <a:r>
+              <a:rPr lang="en-US" dirty="0"/>
+              <a:t> compute capacity at a significant discount. </a:t>
             </a:r>
           </a:p>
           <a:p>
@@ -20245,7 +20253,7 @@
         <p:spPr>
           <a:xfrm>
             <a:off x="465138" y="1960860"/>
-            <a:ext cx="9572625" cy="3139321"/>
+            <a:ext cx="9572625" cy="3754874"/>
           </a:xfrm>
         </p:spPr>
         <p:txBody>
@@ -20300,15 +20308,27 @@
           <a:p>
             <a:r>
               <a:rPr lang="en-US" dirty="0"/>
-              <a:t>Plus others (</a:t>
-            </a:r>
-            <a:r>
-              <a:rPr lang="en-US"/>
-              <a:t>ask STU </a:t>
-            </a:r>
-            <a:r>
-              <a:rPr lang="en-US" dirty="0"/>
-              <a:t>leads)</a:t>
+              <a:t>Plus others (ask STU leads)</a:t>
+            </a:r>
+          </a:p>
+          <a:p>
+            <a:pPr marL="571500" lvl="1" indent="-342900">
+              <a:buFont typeface="Arial" panose="020B0604020202020204" pitchFamily="34" charset="0"/>
+              <a:buChar char="•"/>
+            </a:pPr>
+            <a:r>
+              <a:rPr lang="en-US" dirty="0"/>
+              <a:t>Azure Customer Offer (ACO)</a:t>
+            </a:r>
+          </a:p>
+          <a:p>
+            <a:pPr marL="571500" lvl="1" indent="-342900">
+              <a:buFont typeface="Arial" panose="020B0604020202020204" pitchFamily="34" charset="0"/>
+              <a:buChar char="•"/>
+            </a:pPr>
+            <a:r>
+              <a:rPr lang="en-US" dirty="0"/>
+              <a:t>MAC agreements (26%+ 😮)</a:t>
             </a:r>
           </a:p>
           <a:p>
@@ -22848,12 +22868,12 @@
 </file>
 
 <file path=customXml/item1.xml><?xml version="1.0" encoding="utf-8"?>
-<?mso-contentType ?>
-<FormTemplates xmlns="http://schemas.microsoft.com/sharepoint/v3/contenttype/forms">
-  <Display>DocumentLibraryForm</Display>
-  <Edit>DocumentLibraryForm</Edit>
-  <New>DocumentLibraryForm</New>
-</FormTemplates>
+<p:properties xmlns:p="http://schemas.microsoft.com/office/2006/metadata/properties" xmlns:xsi="http://www.w3.org/2001/XMLSchema-instance" xmlns:pc="http://schemas.microsoft.com/office/infopath/2007/PartnerControls">
+  <documentManagement>
+    <_ip_UnifiedCompliancePolicyUIAction xmlns="http://schemas.microsoft.com/sharepoint/v3" xsi:nil="true"/>
+    <_ip_UnifiedCompliancePolicyProperties xmlns="http://schemas.microsoft.com/sharepoint/v3" xsi:nil="true"/>
+  </documentManagement>
+</p:properties>
 </file>
 
 <file path=customXml/item2.xml><?xml version="1.0" encoding="utf-8"?>
@@ -23065,18 +23085,29 @@
 </file>
 
 <file path=customXml/item3.xml><?xml version="1.0" encoding="utf-8"?>
-<p:properties xmlns:p="http://schemas.microsoft.com/office/2006/metadata/properties" xmlns:xsi="http://www.w3.org/2001/XMLSchema-instance" xmlns:pc="http://schemas.microsoft.com/office/infopath/2007/PartnerControls">
-  <documentManagement>
-    <_ip_UnifiedCompliancePolicyUIAction xmlns="http://schemas.microsoft.com/sharepoint/v3" xsi:nil="true"/>
-    <_ip_UnifiedCompliancePolicyProperties xmlns="http://schemas.microsoft.com/sharepoint/v3" xsi:nil="true"/>
-  </documentManagement>
-</p:properties>
+<?mso-contentType ?>
+<FormTemplates xmlns="http://schemas.microsoft.com/sharepoint/v3/contenttype/forms">
+  <Display>DocumentLibraryForm</Display>
+  <Edit>DocumentLibraryForm</Edit>
+  <New>DocumentLibraryForm</New>
+</FormTemplates>
 </file>
 
 <file path=customXml/itemProps1.xml><?xml version="1.0" encoding="utf-8"?>
-<ds:datastoreItem xmlns:ds="http://schemas.openxmlformats.org/officeDocument/2006/customXml" ds:itemID="{758FDAC0-319D-4A54-8D8E-1D42CB1F8004}">
+<ds:datastoreItem xmlns:ds="http://schemas.openxmlformats.org/officeDocument/2006/customXml" ds:itemID="{F990F116-B58F-4255-B05B-DA3808E0E5C6}">
   <ds:schemaRefs>
-    <ds:schemaRef ds:uri="http://schemas.microsoft.com/sharepoint/v3/contenttype/forms"/>
+    <ds:schemaRef ds:uri="230e9df3-be65-4c73-a93b-d1236ebd677e"/>
+    <ds:schemaRef ds:uri="http://purl.org/dc/terms/"/>
+    <ds:schemaRef ds:uri="http://schemas.openxmlformats.org/package/2006/metadata/core-properties"/>
+    <ds:schemaRef ds:uri="http://schemas.microsoft.com/office/2006/documentManagement/types"/>
+    <ds:schemaRef ds:uri="http://schemas.microsoft.com/office/infopath/2007/PartnerControls"/>
+    <ds:schemaRef ds:uri="a647c833-fbf3-42d0-9d1a-fdc4c4d8b08f"/>
+    <ds:schemaRef ds:uri="http://purl.org/dc/elements/1.1/"/>
+    <ds:schemaRef ds:uri="http://schemas.microsoft.com/office/2006/metadata/properties"/>
+    <ds:schemaRef ds:uri="http://schemas.microsoft.com/sharepoint/v3"/>
+    <ds:schemaRef ds:uri="ebe725d4-5a61-4827-9af4-da8e7f768b99"/>
+    <ds:schemaRef ds:uri="http://www.w3.org/XML/1998/namespace"/>
+    <ds:schemaRef ds:uri="http://purl.org/dc/dcmitype/"/>
   </ds:schemaRefs>
 </ds:datastoreItem>
 </file>
@@ -23102,20 +23133,9 @@
 </file>
 
 <file path=customXml/itemProps3.xml><?xml version="1.0" encoding="utf-8"?>
-<ds:datastoreItem xmlns:ds="http://schemas.openxmlformats.org/officeDocument/2006/customXml" ds:itemID="{F990F116-B58F-4255-B05B-DA3808E0E5C6}">
+<ds:datastoreItem xmlns:ds="http://schemas.openxmlformats.org/officeDocument/2006/customXml" ds:itemID="{758FDAC0-319D-4A54-8D8E-1D42CB1F8004}">
   <ds:schemaRefs>
-    <ds:schemaRef ds:uri="230e9df3-be65-4c73-a93b-d1236ebd677e"/>
-    <ds:schemaRef ds:uri="http://purl.org/dc/terms/"/>
-    <ds:schemaRef ds:uri="http://schemas.openxmlformats.org/package/2006/metadata/core-properties"/>
-    <ds:schemaRef ds:uri="http://schemas.microsoft.com/office/2006/documentManagement/types"/>
-    <ds:schemaRef ds:uri="http://schemas.microsoft.com/office/infopath/2007/PartnerControls"/>
-    <ds:schemaRef ds:uri="a647c833-fbf3-42d0-9d1a-fdc4c4d8b08f"/>
-    <ds:schemaRef ds:uri="http://purl.org/dc/elements/1.1/"/>
-    <ds:schemaRef ds:uri="http://schemas.microsoft.com/office/2006/metadata/properties"/>
-    <ds:schemaRef ds:uri="http://schemas.microsoft.com/sharepoint/v3"/>
-    <ds:schemaRef ds:uri="ebe725d4-5a61-4827-9af4-da8e7f768b99"/>
-    <ds:schemaRef ds:uri="http://www.w3.org/XML/1998/namespace"/>
-    <ds:schemaRef ds:uri="http://purl.org/dc/dcmitype/"/>
+    <ds:schemaRef ds:uri="http://schemas.microsoft.com/sharepoint/v3/contenttype/forms"/>
   </ds:schemaRefs>
 </ds:datastoreItem>
 </file>

</xml_diff>